<commit_message>
doc + NDocUtil small changes
</commit_message>
<xml_diff>
--- a/src/NCase.Doc/intern/ReadmeCaroussel.pptx
+++ b/src/NCase.Doc/intern/ReadmeCaroussel.pptx
@@ -104,6 +104,22 @@
       </a:defRPr>
     </a:lvl9pPr>
   </p:defaultTextStyle>
+  <p:extLst>
+    <p:ext uri="{EFAFB233-063F-42B5-8137-9DF3F51BA10A}">
+      <p15:sldGuideLst xmlns:p15="http://schemas.microsoft.com/office/powerpoint/2012/main">
+        <p15:guide id="1" orient="horz" pos="2160">
+          <p15:clr>
+            <a:srgbClr val="A4A3A4"/>
+          </p15:clr>
+        </p15:guide>
+        <p15:guide id="2" pos="3840">
+          <p15:clr>
+            <a:srgbClr val="A4A3A4"/>
+          </p15:clr>
+        </p15:guide>
+      </p15:sldGuideLst>
+    </p:ext>
+  </p:extLst>
 </p:presentation>
 </file>
 
@@ -238,7 +254,7 @@
           <a:p>
             <a:fld id="{AF1194EC-C915-441E-AD9A-616349DBA75B}" type="datetimeFigureOut">
               <a:rPr lang="en-US" smtClean="0"/>
-              <a:t>12/3/2015</a:t>
+              <a:t>1/25/2016</a:t>
             </a:fld>
             <a:endParaRPr lang="en-US"/>
           </a:p>
@@ -280,7 +296,7 @@
           <a:p>
             <a:fld id="{283AF68C-C093-4BDC-8CF7-53FAADAA3F33}" type="slidenum">
               <a:rPr lang="en-US" smtClean="0"/>
-              <a:t>‹Nr.›</a:t>
+              <a:t>‹#›</a:t>
             </a:fld>
             <a:endParaRPr lang="en-US"/>
           </a:p>
@@ -408,7 +424,7 @@
           <a:p>
             <a:fld id="{AF1194EC-C915-441E-AD9A-616349DBA75B}" type="datetimeFigureOut">
               <a:rPr lang="en-US" smtClean="0"/>
-              <a:t>12/3/2015</a:t>
+              <a:t>1/25/2016</a:t>
             </a:fld>
             <a:endParaRPr lang="en-US"/>
           </a:p>
@@ -450,7 +466,7 @@
           <a:p>
             <a:fld id="{283AF68C-C093-4BDC-8CF7-53FAADAA3F33}" type="slidenum">
               <a:rPr lang="en-US" smtClean="0"/>
-              <a:t>‹Nr.›</a:t>
+              <a:t>‹#›</a:t>
             </a:fld>
             <a:endParaRPr lang="en-US"/>
           </a:p>
@@ -588,7 +604,7 @@
           <a:p>
             <a:fld id="{AF1194EC-C915-441E-AD9A-616349DBA75B}" type="datetimeFigureOut">
               <a:rPr lang="en-US" smtClean="0"/>
-              <a:t>12/3/2015</a:t>
+              <a:t>1/25/2016</a:t>
             </a:fld>
             <a:endParaRPr lang="en-US"/>
           </a:p>
@@ -630,7 +646,7 @@
           <a:p>
             <a:fld id="{283AF68C-C093-4BDC-8CF7-53FAADAA3F33}" type="slidenum">
               <a:rPr lang="en-US" smtClean="0"/>
-              <a:t>‹Nr.›</a:t>
+              <a:t>‹#›</a:t>
             </a:fld>
             <a:endParaRPr lang="en-US"/>
           </a:p>
@@ -758,7 +774,7 @@
           <a:p>
             <a:fld id="{AF1194EC-C915-441E-AD9A-616349DBA75B}" type="datetimeFigureOut">
               <a:rPr lang="en-US" smtClean="0"/>
-              <a:t>12/3/2015</a:t>
+              <a:t>1/25/2016</a:t>
             </a:fld>
             <a:endParaRPr lang="en-US"/>
           </a:p>
@@ -800,7 +816,7 @@
           <a:p>
             <a:fld id="{283AF68C-C093-4BDC-8CF7-53FAADAA3F33}" type="slidenum">
               <a:rPr lang="en-US" smtClean="0"/>
-              <a:t>‹Nr.›</a:t>
+              <a:t>‹#›</a:t>
             </a:fld>
             <a:endParaRPr lang="en-US"/>
           </a:p>
@@ -1004,7 +1020,7 @@
           <a:p>
             <a:fld id="{AF1194EC-C915-441E-AD9A-616349DBA75B}" type="datetimeFigureOut">
               <a:rPr lang="en-US" smtClean="0"/>
-              <a:t>12/3/2015</a:t>
+              <a:t>1/25/2016</a:t>
             </a:fld>
             <a:endParaRPr lang="en-US"/>
           </a:p>
@@ -1046,7 +1062,7 @@
           <a:p>
             <a:fld id="{283AF68C-C093-4BDC-8CF7-53FAADAA3F33}" type="slidenum">
               <a:rPr lang="en-US" smtClean="0"/>
-              <a:t>‹Nr.›</a:t>
+              <a:t>‹#›</a:t>
             </a:fld>
             <a:endParaRPr lang="en-US"/>
           </a:p>
@@ -1236,7 +1252,7 @@
           <a:p>
             <a:fld id="{AF1194EC-C915-441E-AD9A-616349DBA75B}" type="datetimeFigureOut">
               <a:rPr lang="en-US" smtClean="0"/>
-              <a:t>12/3/2015</a:t>
+              <a:t>1/25/2016</a:t>
             </a:fld>
             <a:endParaRPr lang="en-US"/>
           </a:p>
@@ -1278,7 +1294,7 @@
           <a:p>
             <a:fld id="{283AF68C-C093-4BDC-8CF7-53FAADAA3F33}" type="slidenum">
               <a:rPr lang="en-US" smtClean="0"/>
-              <a:t>‹Nr.›</a:t>
+              <a:t>‹#›</a:t>
             </a:fld>
             <a:endParaRPr lang="en-US"/>
           </a:p>
@@ -1603,7 +1619,7 @@
           <a:p>
             <a:fld id="{AF1194EC-C915-441E-AD9A-616349DBA75B}" type="datetimeFigureOut">
               <a:rPr lang="en-US" smtClean="0"/>
-              <a:t>12/3/2015</a:t>
+              <a:t>1/25/2016</a:t>
             </a:fld>
             <a:endParaRPr lang="en-US"/>
           </a:p>
@@ -1645,7 +1661,7 @@
           <a:p>
             <a:fld id="{283AF68C-C093-4BDC-8CF7-53FAADAA3F33}" type="slidenum">
               <a:rPr lang="en-US" smtClean="0"/>
-              <a:t>‹Nr.›</a:t>
+              <a:t>‹#›</a:t>
             </a:fld>
             <a:endParaRPr lang="en-US"/>
           </a:p>
@@ -1721,7 +1737,7 @@
           <a:p>
             <a:fld id="{AF1194EC-C915-441E-AD9A-616349DBA75B}" type="datetimeFigureOut">
               <a:rPr lang="en-US" smtClean="0"/>
-              <a:t>12/3/2015</a:t>
+              <a:t>1/25/2016</a:t>
             </a:fld>
             <a:endParaRPr lang="en-US"/>
           </a:p>
@@ -1763,7 +1779,7 @@
           <a:p>
             <a:fld id="{283AF68C-C093-4BDC-8CF7-53FAADAA3F33}" type="slidenum">
               <a:rPr lang="en-US" smtClean="0"/>
-              <a:t>‹Nr.›</a:t>
+              <a:t>‹#›</a:t>
             </a:fld>
             <a:endParaRPr lang="en-US"/>
           </a:p>
@@ -1816,7 +1832,7 @@
           <a:p>
             <a:fld id="{AF1194EC-C915-441E-AD9A-616349DBA75B}" type="datetimeFigureOut">
               <a:rPr lang="en-US" smtClean="0"/>
-              <a:t>12/3/2015</a:t>
+              <a:t>1/25/2016</a:t>
             </a:fld>
             <a:endParaRPr lang="en-US"/>
           </a:p>
@@ -1858,7 +1874,7 @@
           <a:p>
             <a:fld id="{283AF68C-C093-4BDC-8CF7-53FAADAA3F33}" type="slidenum">
               <a:rPr lang="en-US" smtClean="0"/>
-              <a:t>‹Nr.›</a:t>
+              <a:t>‹#›</a:t>
             </a:fld>
             <a:endParaRPr lang="en-US"/>
           </a:p>
@@ -2093,7 +2109,7 @@
           <a:p>
             <a:fld id="{AF1194EC-C915-441E-AD9A-616349DBA75B}" type="datetimeFigureOut">
               <a:rPr lang="en-US" smtClean="0"/>
-              <a:t>12/3/2015</a:t>
+              <a:t>1/25/2016</a:t>
             </a:fld>
             <a:endParaRPr lang="en-US"/>
           </a:p>
@@ -2135,7 +2151,7 @@
           <a:p>
             <a:fld id="{283AF68C-C093-4BDC-8CF7-53FAADAA3F33}" type="slidenum">
               <a:rPr lang="en-US" smtClean="0"/>
-              <a:t>‹Nr.›</a:t>
+              <a:t>‹#›</a:t>
             </a:fld>
             <a:endParaRPr lang="en-US"/>
           </a:p>
@@ -2346,7 +2362,7 @@
           <a:p>
             <a:fld id="{AF1194EC-C915-441E-AD9A-616349DBA75B}" type="datetimeFigureOut">
               <a:rPr lang="en-US" smtClean="0"/>
-              <a:t>12/3/2015</a:t>
+              <a:t>1/25/2016</a:t>
             </a:fld>
             <a:endParaRPr lang="en-US"/>
           </a:p>
@@ -2388,7 +2404,7 @@
           <a:p>
             <a:fld id="{283AF68C-C093-4BDC-8CF7-53FAADAA3F33}" type="slidenum">
               <a:rPr lang="en-US" smtClean="0"/>
-              <a:t>‹Nr.›</a:t>
+              <a:t>‹#›</a:t>
             </a:fld>
             <a:endParaRPr lang="en-US"/>
           </a:p>
@@ -2559,7 +2575,7 @@
           <a:p>
             <a:fld id="{AF1194EC-C915-441E-AD9A-616349DBA75B}" type="datetimeFigureOut">
               <a:rPr lang="en-US" smtClean="0"/>
-              <a:t>12/3/2015</a:t>
+              <a:t>1/25/2016</a:t>
             </a:fld>
             <a:endParaRPr lang="en-US"/>
           </a:p>
@@ -2637,7 +2653,7 @@
           <a:p>
             <a:fld id="{283AF68C-C093-4BDC-8CF7-53FAADAA3F33}" type="slidenum">
               <a:rPr lang="en-US" smtClean="0"/>
-              <a:t>‹Nr.›</a:t>
+              <a:t>‹#›</a:t>
             </a:fld>
             <a:endParaRPr lang="en-US"/>
           </a:p>
@@ -2966,7 +2982,7 @@
       </p:grpSpPr>
       <p:pic>
         <p:nvPicPr>
-          <p:cNvPr id="3" name="Grafik 2"/>
+          <p:cNvPr id="2" name="Picture 1"/>
           <p:cNvPicPr>
             <a:picLocks noChangeAspect="1"/>
           </p:cNvPicPr>
@@ -2980,8 +2996,8 @@
         </p:blipFill>
         <p:spPr>
           <a:xfrm>
-            <a:off x="747163" y="940600"/>
-            <a:ext cx="3565891" cy="2030400"/>
+            <a:off x="245327" y="0"/>
+            <a:ext cx="6266985" cy="5509857"/>
           </a:xfrm>
           <a:prstGeom prst="rect">
             <a:avLst/>
@@ -3263,7 +3279,7 @@
   <a:extraClrSchemeLst/>
   <a:extLst>
     <a:ext uri="{05A4C25C-085E-4340-85A3-A5531E510DB2}">
-      <thm15:themeFamily xmlns="" xmlns:thm15="http://schemas.microsoft.com/office/thememl/2012/main" name="Office Theme" id="{62F939B6-93AF-4DB8-9C6B-D6C7DFDC589F}" vid="{4A3C46E8-61CC-4603-A589-7422A47A8E4A}"/>
+      <thm15:themeFamily xmlns:thm15="http://schemas.microsoft.com/office/thememl/2012/main" name="Office Theme" id="{62F939B6-93AF-4DB8-9C6B-D6C7DFDC589F}" vid="{4A3C46E8-61CC-4603-A589-7422A47A8E4A}"/>
     </a:ext>
   </a:extLst>
 </a:theme>

</xml_diff>